<commit_message>
realizando ajustes finais + banner
</commit_message>
<xml_diff>
--- a/Banner.pptx
+++ b/Banner.pptx
@@ -232,12 +232,12 @@
   <pc:docChgLst>
     <pc:chgData name="Gabriel Souza" userId="3aec459d9ad26342" providerId="LiveId" clId="{81108645-B148-42B2-9650-2E0488FE199C}"/>
     <pc:docChg chg="undo custSel modSld">
-      <pc:chgData name="Gabriel Souza" userId="3aec459d9ad26342" providerId="LiveId" clId="{81108645-B148-42B2-9650-2E0488FE199C}" dt="2025-10-31T19:40:47.478" v="151" actId="1076"/>
+      <pc:chgData name="Gabriel Souza" userId="3aec459d9ad26342" providerId="LiveId" clId="{81108645-B148-42B2-9650-2E0488FE199C}" dt="2025-11-13T23:46:28.339" v="285" actId="1076"/>
       <pc:docMkLst>
         <pc:docMk/>
       </pc:docMkLst>
       <pc:sldChg chg="addSp delSp modSp mod">
-        <pc:chgData name="Gabriel Souza" userId="3aec459d9ad26342" providerId="LiveId" clId="{81108645-B148-42B2-9650-2E0488FE199C}" dt="2025-10-31T19:40:47.478" v="151" actId="1076"/>
+        <pc:chgData name="Gabriel Souza" userId="3aec459d9ad26342" providerId="LiveId" clId="{81108645-B148-42B2-9650-2E0488FE199C}" dt="2025-11-13T23:46:28.339" v="285" actId="1076"/>
         <pc:sldMkLst>
           <pc:docMk/>
           <pc:sldMk cId="0" sldId="257"/>
@@ -251,7 +251,7 @@
           </ac:spMkLst>
         </pc:spChg>
         <pc:spChg chg="mod">
-          <ac:chgData name="Gabriel Souza" userId="3aec459d9ad26342" providerId="LiveId" clId="{81108645-B148-42B2-9650-2E0488FE199C}" dt="2025-10-31T19:36:17.238" v="89" actId="20577"/>
+          <ac:chgData name="Gabriel Souza" userId="3aec459d9ad26342" providerId="LiveId" clId="{81108645-B148-42B2-9650-2E0488FE199C}" dt="2025-11-13T23:45:08.059" v="270" actId="12"/>
           <ac:spMkLst>
             <pc:docMk/>
             <pc:sldMk cId="0" sldId="257"/>
@@ -259,7 +259,7 @@
           </ac:spMkLst>
         </pc:spChg>
         <pc:spChg chg="mod">
-          <ac:chgData name="Gabriel Souza" userId="3aec459d9ad26342" providerId="LiveId" clId="{81108645-B148-42B2-9650-2E0488FE199C}" dt="2025-10-31T19:40:45.648" v="150" actId="20577"/>
+          <ac:chgData name="Gabriel Souza" userId="3aec459d9ad26342" providerId="LiveId" clId="{81108645-B148-42B2-9650-2E0488FE199C}" dt="2025-11-13T23:46:18.698" v="284" actId="20577"/>
           <ac:spMkLst>
             <pc:docMk/>
             <pc:sldMk cId="0" sldId="257"/>
@@ -267,7 +267,7 @@
           </ac:spMkLst>
         </pc:spChg>
         <pc:spChg chg="mod">
-          <ac:chgData name="Gabriel Souza" userId="3aec459d9ad26342" providerId="LiveId" clId="{81108645-B148-42B2-9650-2E0488FE199C}" dt="2025-10-31T18:46:08.809" v="55" actId="20577"/>
+          <ac:chgData name="Gabriel Souza" userId="3aec459d9ad26342" providerId="LiveId" clId="{81108645-B148-42B2-9650-2E0488FE199C}" dt="2025-11-13T23:46:28.339" v="285" actId="1076"/>
           <ac:spMkLst>
             <pc:docMk/>
             <pc:sldMk cId="0" sldId="257"/>
@@ -283,7 +283,15 @@
           </ac:graphicFrameMkLst>
         </pc:graphicFrameChg>
         <pc:picChg chg="add mod">
-          <ac:chgData name="Gabriel Souza" userId="3aec459d9ad26342" providerId="LiveId" clId="{81108645-B148-42B2-9650-2E0488FE199C}" dt="2025-10-31T19:40:47.478" v="151" actId="1076"/>
+          <ac:chgData name="Gabriel Souza" userId="3aec459d9ad26342" providerId="LiveId" clId="{81108645-B148-42B2-9650-2E0488FE199C}" dt="2025-11-13T23:42:30.004" v="254" actId="1076"/>
+          <ac:picMkLst>
+            <pc:docMk/>
+            <pc:sldMk cId="0" sldId="257"/>
+            <ac:picMk id="8" creationId="{47EA2AF3-87B7-48A8-9F41-A772F18C6AD4}"/>
+          </ac:picMkLst>
+        </pc:picChg>
+        <pc:picChg chg="add del mod">
+          <ac:chgData name="Gabriel Souza" userId="3aec459d9ad26342" providerId="LiveId" clId="{81108645-B148-42B2-9650-2E0488FE199C}" dt="2025-11-13T23:32:53.386" v="209" actId="478"/>
           <ac:picMkLst>
             <pc:docMk/>
             <pc:sldMk cId="0" sldId="257"/>
@@ -489,7 +497,7 @@
             <a:fld id="{B34088D9-6F99-4774-8F18-D88D64460132}" type="datetimeFigureOut">
               <a:rPr lang="pt-BR" smtClean="0"/>
               <a:pPr/>
-              <a:t>31/10/2025</a:t>
+              <a:t>13/11/2025</a:t>
             </a:fld>
             <a:endParaRPr lang="pt-BR"/>
           </a:p>
@@ -704,7 +712,7 @@
             <a:fld id="{B34088D9-6F99-4774-8F18-D88D64460132}" type="datetimeFigureOut">
               <a:rPr lang="pt-BR" smtClean="0"/>
               <a:pPr/>
-              <a:t>31/10/2025</a:t>
+              <a:t>13/11/2025</a:t>
             </a:fld>
             <a:endParaRPr lang="pt-BR"/>
           </a:p>
@@ -1219,13 +1227,24 @@
                 <a:solidFill>
                   <a:schemeClr val="tx1"/>
                 </a:solidFill>
+                <a:latin typeface="Arial" panose="020B0604020202020204" pitchFamily="34" charset="0"/>
+                <a:cs typeface="Arial" panose="020B0604020202020204" pitchFamily="34" charset="0"/>
               </a:rPr>
               <a:t>INTRODUÇÃO</a:t>
             </a:r>
-            <a:endParaRPr lang="pt-BR" sz="7500" b="1" dirty="0">
+          </a:p>
+          <a:p>
+            <a:pPr algn="just">
+              <a:spcBef>
+                <a:spcPts val="0"/>
+              </a:spcBef>
+            </a:pPr>
+            <a:endParaRPr lang="pt-BR" sz="2000" b="1" dirty="0">
               <a:solidFill>
                 <a:schemeClr val="tx1"/>
               </a:solidFill>
+              <a:latin typeface="Arial" panose="020B0604020202020204" pitchFamily="34" charset="0"/>
+              <a:cs typeface="Arial" panose="020B0604020202020204" pitchFamily="34" charset="0"/>
             </a:endParaRPr>
           </a:p>
           <a:p>
@@ -1239,40 +1258,10 @@
                 <a:solidFill>
                   <a:schemeClr val="tx1"/>
                 </a:solidFill>
-              </a:rPr>
-              <a:t>   O simulador é um ambiente 2D desenvolvido em </a:t>
-            </a:r>
-            <a:r>
-              <a:rPr lang="pt-BR" sz="3200" dirty="0" err="1">
-                <a:solidFill>
-                  <a:schemeClr val="tx1"/>
-                </a:solidFill>
-              </a:rPr>
-              <a:t>Pygame</a:t>
-            </a:r>
-            <a:r>
-              <a:rPr lang="pt-BR" sz="3200" dirty="0">
-                <a:solidFill>
-                  <a:schemeClr val="tx1"/>
-                </a:solidFill>
-              </a:rPr>
-              <a:t> que modela um cruzamento de tráfego controlado por um sistema de lógica Fuzzy implementado com </a:t>
-            </a:r>
-            <a:r>
-              <a:rPr lang="pt-BR" sz="3200" dirty="0" err="1">
-                <a:solidFill>
-                  <a:schemeClr val="tx1"/>
-                </a:solidFill>
-              </a:rPr>
-              <a:t>scikit-fuzzy</a:t>
-            </a:r>
-            <a:r>
-              <a:rPr lang="pt-BR" sz="3200" dirty="0">
-                <a:solidFill>
-                  <a:schemeClr val="tx1"/>
-                </a:solidFill>
-              </a:rPr>
-              <a:t>. O projeto gerencia semáforos visuais para dois eixos lógicos (vertical e horizontal). A interação permite o spawn manual de carros (que se movem em linhas retas) nas duas direções usando os comandos H (horizontal) e V (vertical). O sistema utiliza classes para Carro (Car), Semáforo (TrafficLight) e o Controlador Fuzzy (FuzzyController).</a:t>
+                <a:latin typeface="Arial" panose="020B0604020202020204" pitchFamily="34" charset="0"/>
+                <a:cs typeface="Arial" panose="020B0604020202020204" pitchFamily="34" charset="0"/>
+              </a:rPr>
+              <a:t>  Simulador 2D (pygame) de um cruzamento controlado por lógica Fuzzy. O sistema usa variáveis linguísticas (fluxo de carros, fluxo de pedestres, horário e clima) para recompor dinamicamente o tempo do verde do semáforo. A base de regras Fuzzy avalia padrões do ambiente e recomenda tempo de semáforo; o estado e decisões são exibidos na HUD e logs de ativação são impressos para análise.</a:t>
             </a:r>
           </a:p>
           <a:p>
@@ -1285,6 +1274,8 @@
               <a:solidFill>
                 <a:schemeClr val="tx1"/>
               </a:solidFill>
+              <a:latin typeface="Arial" panose="020B0604020202020204" pitchFamily="34" charset="0"/>
+              <a:cs typeface="Arial" panose="020B0604020202020204" pitchFamily="34" charset="0"/>
             </a:endParaRPr>
           </a:p>
           <a:p>
@@ -1298,13 +1289,17 @@
                 <a:solidFill>
                   <a:schemeClr val="tx1"/>
                 </a:solidFill>
+                <a:latin typeface="Arial" panose="020B0604020202020204" pitchFamily="34" charset="0"/>
+                <a:cs typeface="Arial" panose="020B0604020202020204" pitchFamily="34" charset="0"/>
               </a:rPr>
               <a:t>OBJETIVO</a:t>
             </a:r>
-            <a:endParaRPr lang="pt-BR" sz="7500" b="1" dirty="0">
+            <a:endParaRPr lang="pt-BR" sz="2000" b="1" dirty="0">
               <a:solidFill>
                 <a:schemeClr val="tx1"/>
               </a:solidFill>
+              <a:latin typeface="Arial" panose="020B0604020202020204" pitchFamily="34" charset="0"/>
+              <a:cs typeface="Arial" panose="020B0604020202020204" pitchFamily="34" charset="0"/>
             </a:endParaRPr>
           </a:p>
           <a:p>
@@ -1313,25 +1308,12 @@
                 <a:spcPts val="0"/>
               </a:spcBef>
             </a:pPr>
-            <a:r>
-              <a:rPr lang="pt-BR" sz="3200" dirty="0">
-                <a:solidFill>
-                  <a:schemeClr val="tx1"/>
-                </a:solidFill>
-              </a:rPr>
-              <a:t>   O principal objetivo do simulador é demonstrar a aplicação de um controlador Fuzzy para determinar dinamicamente o momento ideal para a troca de semáforos. O controlador, a partir de duas entradas — o número de carros esperando na via vermelha e o tempo que o sinal verde atual já está ativo (em segundos) — calcula uma "prioridade de troca". O sistema visa evitar trocas imediatas e favorecer a via que está acumulando maior tempo de espera, buscando assim equilibrar o tempo de serviço da via atual e o tempo de espera da via bloqueada. Se a pontuação de prioridade gerada pela lógica Fuzzy ultrapassar um limiar de 5.0, a sequência de troca (verde → amarelo → vermelho) é iniciada pelo TrafficLightController.</a:t>
-            </a:r>
-          </a:p>
-          <a:p>
-            <a:pPr algn="just">
-              <a:spcBef>
-                <a:spcPts val="0"/>
-              </a:spcBef>
-            </a:pPr>
-            <a:endParaRPr lang="pt-BR" sz="3200" dirty="0">
+            <a:endParaRPr lang="pt-BR" sz="2000" b="1" dirty="0">
               <a:solidFill>
                 <a:schemeClr val="tx1"/>
               </a:solidFill>
+              <a:latin typeface="Arial" panose="020B0604020202020204" pitchFamily="34" charset="0"/>
+              <a:cs typeface="Arial" panose="020B0604020202020204" pitchFamily="34" charset="0"/>
             </a:endParaRPr>
           </a:p>
           <a:p>
@@ -1341,44 +1323,307 @@
               </a:spcBef>
             </a:pPr>
             <a:r>
+              <a:rPr lang="pt-BR" sz="3200" dirty="0">
+                <a:solidFill>
+                  <a:schemeClr val="tx1"/>
+                </a:solidFill>
+                <a:latin typeface="Arial" panose="020B0604020202020204" pitchFamily="34" charset="0"/>
+                <a:cs typeface="Arial" panose="020B0604020202020204" pitchFamily="34" charset="0"/>
+              </a:rPr>
+              <a:t>   Integrar um controlador Fuzzy que ajuste automaticamente o tempo verde conforme condições reais do ambiente, mantendo compatibilidade com a heurística de prioridade existente. Reduzir esperas indevidas, priorizar fluxos críticos (picos/chuva) e fornecer telemetria (regras ativadas, grau de ativação, tempo recomendado) para facilitar calibração.</a:t>
+            </a:r>
+          </a:p>
+          <a:p>
+            <a:pPr algn="just">
+              <a:spcBef>
+                <a:spcPts val="0"/>
+              </a:spcBef>
+            </a:pPr>
+            <a:r>
               <a:rPr lang="pt-BR" sz="6600" b="1" dirty="0">
                 <a:solidFill>
                   <a:schemeClr val="tx1"/>
                 </a:solidFill>
+                <a:latin typeface="Arial" panose="020B0604020202020204" pitchFamily="34" charset="0"/>
+                <a:cs typeface="Arial" panose="020B0604020202020204" pitchFamily="34" charset="0"/>
               </a:rPr>
               <a:t>MÉTODOS</a:t>
             </a:r>
-            <a:endParaRPr lang="pt-BR" sz="7500" b="1" dirty="0">
+          </a:p>
+          <a:p>
+            <a:pPr algn="just">
+              <a:spcBef>
+                <a:spcPts val="0"/>
+              </a:spcBef>
+            </a:pPr>
+            <a:endParaRPr lang="pt-BR" sz="2000" b="1" dirty="0">
               <a:solidFill>
                 <a:schemeClr val="tx1"/>
               </a:solidFill>
+              <a:latin typeface="Arial" panose="020B0604020202020204" pitchFamily="34" charset="0"/>
+              <a:cs typeface="Arial" panose="020B0604020202020204" pitchFamily="34" charset="0"/>
             </a:endParaRPr>
           </a:p>
           <a:p>
-            <a:pPr algn="just">
-              <a:spcBef>
-                <a:spcPts val="0"/>
-              </a:spcBef>
-            </a:pPr>
-            <a:r>
-              <a:rPr lang="pt-BR" sz="3200" dirty="0">
-                <a:solidFill>
-                  <a:schemeClr val="tx1"/>
-                </a:solidFill>
-              </a:rPr>
-              <a:t>   O sistema centraliza-se na classe FuzzyController, que recebe as entradas e processa a lógica. As variáveis antecedentes são carros_via_vermelha (universo 0..10, termos: 'poucos', 'medio', 'muitos') e tempo_verde_atual (universo 0..20, termos: 'curto', 'medio', 'longo' definidos com funções triangulares). O processo de inferência segue quatro etapas: 1. Fuzzificação, que converte as entradas em graus de pertinência; 2. Avaliação de regras (usando a operação mínima para AND); 3. Agregação das saídas parciais; e 4. Defuzzificação (método centroid) para produzir a pontuação contínua prioridade_troca (universo 0..10). Regras chave estabelecem prioridade ALTA quando há muitos carros na vermelha e o verde está longo ou médio.</a:t>
-            </a:r>
-          </a:p>
-          <a:p>
-            <a:pPr algn="just">
-              <a:spcBef>
-                <a:spcPts val="0"/>
-              </a:spcBef>
-            </a:pPr>
+            <a:pPr marL="457200" indent="-457200" algn="just">
+              <a:spcBef>
+                <a:spcPts val="0"/>
+              </a:spcBef>
+              <a:buFont typeface="Arial" panose="020B0604020202020204" pitchFamily="34" charset="0"/>
+              <a:buChar char="•"/>
+            </a:pPr>
+            <a:r>
+              <a:rPr lang="pt-BR" sz="3200" dirty="0">
+                <a:solidFill>
+                  <a:schemeClr val="tx1"/>
+                </a:solidFill>
+                <a:latin typeface="Arial" panose="020B0604020202020204" pitchFamily="34" charset="0"/>
+                <a:cs typeface="Arial" panose="020B0604020202020204" pitchFamily="34" charset="0"/>
+              </a:rPr>
+              <a:t>   Fuzzificação: funções de pertinência (</a:t>
+            </a:r>
+            <a:r>
+              <a:rPr lang="pt-BR" sz="3200" dirty="0" err="1">
+                <a:solidFill>
+                  <a:schemeClr val="tx1"/>
+                </a:solidFill>
+                <a:latin typeface="Arial" panose="020B0604020202020204" pitchFamily="34" charset="0"/>
+                <a:cs typeface="Arial" panose="020B0604020202020204" pitchFamily="34" charset="0"/>
+              </a:rPr>
+              <a:t>trimf</a:t>
+            </a:r>
+            <a:r>
+              <a:rPr lang="pt-BR" sz="3200" dirty="0">
+                <a:solidFill>
+                  <a:schemeClr val="tx1"/>
+                </a:solidFill>
+                <a:latin typeface="Arial" panose="020B0604020202020204" pitchFamily="34" charset="0"/>
+                <a:cs typeface="Arial" panose="020B0604020202020204" pitchFamily="34" charset="0"/>
+              </a:rPr>
+              <a:t>) para fluxo de carros, fluxo de pedestres, horário e clima; rótulos mapeados para valores numéricos no universo.</a:t>
+            </a:r>
+          </a:p>
+          <a:p>
+            <a:pPr marL="457200" indent="-457200" algn="just">
+              <a:spcBef>
+                <a:spcPts val="0"/>
+              </a:spcBef>
+              <a:buFont typeface="Arial" panose="020B0604020202020204" pitchFamily="34" charset="0"/>
+              <a:buChar char="•"/>
+            </a:pPr>
+            <a:r>
+              <a:rPr lang="pt-BR" sz="3200" dirty="0">
+                <a:solidFill>
+                  <a:schemeClr val="tx1"/>
+                </a:solidFill>
+                <a:latin typeface="Arial" panose="020B0604020202020204" pitchFamily="34" charset="0"/>
+                <a:cs typeface="Arial" panose="020B0604020202020204" pitchFamily="34" charset="0"/>
+              </a:rPr>
+              <a:t>Inferência: base </a:t>
+            </a:r>
+            <a:r>
+              <a:rPr lang="pt-BR" sz="3200" dirty="0" err="1">
+                <a:solidFill>
+                  <a:schemeClr val="tx1"/>
+                </a:solidFill>
+                <a:latin typeface="Arial" panose="020B0604020202020204" pitchFamily="34" charset="0"/>
+                <a:cs typeface="Arial" panose="020B0604020202020204" pitchFamily="34" charset="0"/>
+              </a:rPr>
+              <a:t>fuzzy</a:t>
+            </a:r>
+            <a:r>
+              <a:rPr lang="pt-BR" sz="3200" dirty="0">
+                <a:solidFill>
+                  <a:schemeClr val="tx1"/>
+                </a:solidFill>
+                <a:latin typeface="Arial" panose="020B0604020202020204" pitchFamily="34" charset="0"/>
+                <a:cs typeface="Arial" panose="020B0604020202020204" pitchFamily="34" charset="0"/>
+              </a:rPr>
+              <a:t> com 9 regras implementadas via </a:t>
+            </a:r>
+            <a:r>
+              <a:rPr lang="pt-BR" sz="3200" dirty="0" err="1">
+                <a:solidFill>
+                  <a:schemeClr val="tx1"/>
+                </a:solidFill>
+                <a:latin typeface="Arial" panose="020B0604020202020204" pitchFamily="34" charset="0"/>
+                <a:cs typeface="Arial" panose="020B0604020202020204" pitchFamily="34" charset="0"/>
+              </a:rPr>
+              <a:t>skfuzzy.ctrl.Rule</a:t>
+            </a:r>
+            <a:r>
+              <a:rPr lang="pt-BR" sz="3200" dirty="0">
+                <a:solidFill>
+                  <a:schemeClr val="tx1"/>
+                </a:solidFill>
+                <a:latin typeface="Arial" panose="020B0604020202020204" pitchFamily="34" charset="0"/>
+                <a:cs typeface="Arial" panose="020B0604020202020204" pitchFamily="34" charset="0"/>
+              </a:rPr>
+              <a:t>; combinações AND/OR avaliadas por min/</a:t>
+            </a:r>
+            <a:r>
+              <a:rPr lang="pt-BR" sz="3200" dirty="0" err="1">
+                <a:solidFill>
+                  <a:schemeClr val="tx1"/>
+                </a:solidFill>
+                <a:latin typeface="Arial" panose="020B0604020202020204" pitchFamily="34" charset="0"/>
+                <a:cs typeface="Arial" panose="020B0604020202020204" pitchFamily="34" charset="0"/>
+              </a:rPr>
+              <a:t>max</a:t>
+            </a:r>
+            <a:r>
+              <a:rPr lang="pt-BR" sz="3200" dirty="0">
+                <a:solidFill>
+                  <a:schemeClr val="tx1"/>
+                </a:solidFill>
+                <a:latin typeface="Arial" panose="020B0604020202020204" pitchFamily="34" charset="0"/>
+                <a:cs typeface="Arial" panose="020B0604020202020204" pitchFamily="34" charset="0"/>
+              </a:rPr>
+              <a:t>.</a:t>
+            </a:r>
+          </a:p>
+          <a:p>
+            <a:pPr marL="457200" indent="-457200" algn="just">
+              <a:spcBef>
+                <a:spcPts val="0"/>
+              </a:spcBef>
+              <a:buFont typeface="Arial" panose="020B0604020202020204" pitchFamily="34" charset="0"/>
+              <a:buChar char="•"/>
+            </a:pPr>
+            <a:r>
+              <a:rPr lang="pt-BR" sz="3200" dirty="0">
+                <a:solidFill>
+                  <a:schemeClr val="tx1"/>
+                </a:solidFill>
+                <a:latin typeface="Arial" panose="020B0604020202020204" pitchFamily="34" charset="0"/>
+                <a:cs typeface="Arial" panose="020B0604020202020204" pitchFamily="34" charset="0"/>
+              </a:rPr>
+              <a:t>Defuzzificação: </a:t>
+            </a:r>
+            <a:r>
+              <a:rPr lang="pt-BR" sz="3200" dirty="0" err="1">
+                <a:solidFill>
+                  <a:schemeClr val="tx1"/>
+                </a:solidFill>
+                <a:latin typeface="Arial" panose="020B0604020202020204" pitchFamily="34" charset="0"/>
+                <a:cs typeface="Arial" panose="020B0604020202020204" pitchFamily="34" charset="0"/>
+              </a:rPr>
+              <a:t>centróide</a:t>
+            </a:r>
+            <a:r>
+              <a:rPr lang="pt-BR" sz="3200" dirty="0">
+                <a:solidFill>
+                  <a:schemeClr val="tx1"/>
+                </a:solidFill>
+                <a:latin typeface="Arial" panose="020B0604020202020204" pitchFamily="34" charset="0"/>
+                <a:cs typeface="Arial" panose="020B0604020202020204" pitchFamily="34" charset="0"/>
+              </a:rPr>
+              <a:t> (</a:t>
+            </a:r>
+            <a:r>
+              <a:rPr lang="pt-BR" sz="3200" dirty="0" err="1">
+                <a:solidFill>
+                  <a:schemeClr val="tx1"/>
+                </a:solidFill>
+                <a:latin typeface="Arial" panose="020B0604020202020204" pitchFamily="34" charset="0"/>
+                <a:cs typeface="Arial" panose="020B0604020202020204" pitchFamily="34" charset="0"/>
+              </a:rPr>
+              <a:t>ControlSystemSimulation.compute</a:t>
+            </a:r>
+            <a:r>
+              <a:rPr lang="pt-BR" sz="3200" dirty="0">
+                <a:solidFill>
+                  <a:schemeClr val="tx1"/>
+                </a:solidFill>
+                <a:latin typeface="Arial" panose="020B0604020202020204" pitchFamily="34" charset="0"/>
+                <a:cs typeface="Arial" panose="020B0604020202020204" pitchFamily="34" charset="0"/>
+              </a:rPr>
+              <a:t>()) para produzir o tempo recomendado do semáforo.</a:t>
+            </a:r>
+          </a:p>
+          <a:p>
+            <a:pPr marL="457200" indent="-457200" algn="just">
+              <a:spcBef>
+                <a:spcPts val="0"/>
+              </a:spcBef>
+              <a:buFont typeface="Arial" panose="020B0604020202020204" pitchFamily="34" charset="0"/>
+              <a:buChar char="•"/>
+            </a:pPr>
+            <a:r>
+              <a:rPr lang="pt-BR" sz="3200" dirty="0">
+                <a:solidFill>
+                  <a:schemeClr val="tx1"/>
+                </a:solidFill>
+                <a:latin typeface="Arial" panose="020B0604020202020204" pitchFamily="34" charset="0"/>
+                <a:cs typeface="Arial" panose="020B0604020202020204" pitchFamily="34" charset="0"/>
+              </a:rPr>
+              <a:t>Heurística adicional: cálculo de prioridade (score 0–10) para compatibilidade.</a:t>
+            </a:r>
+          </a:p>
+          <a:p>
+            <a:pPr marL="457200" indent="-457200" algn="just">
+              <a:spcBef>
+                <a:spcPts val="0"/>
+              </a:spcBef>
+              <a:buFont typeface="Arial" panose="020B0604020202020204" pitchFamily="34" charset="0"/>
+              <a:buChar char="•"/>
+            </a:pPr>
+            <a:r>
+              <a:rPr lang="pt-BR" sz="3200" dirty="0">
+                <a:solidFill>
+                  <a:schemeClr val="tx1"/>
+                </a:solidFill>
+                <a:latin typeface="Arial" panose="020B0604020202020204" pitchFamily="34" charset="0"/>
+                <a:cs typeface="Arial" panose="020B0604020202020204" pitchFamily="34" charset="0"/>
+              </a:rPr>
+              <a:t>Diagnóstico: </a:t>
+            </a:r>
+            <a:r>
+              <a:rPr lang="pt-BR" sz="3200" dirty="0" err="1">
+                <a:solidFill>
+                  <a:schemeClr val="tx1"/>
+                </a:solidFill>
+                <a:latin typeface="Arial" panose="020B0604020202020204" pitchFamily="34" charset="0"/>
+                <a:cs typeface="Arial" panose="020B0604020202020204" pitchFamily="34" charset="0"/>
+              </a:rPr>
+              <a:t>interp_membership</a:t>
+            </a:r>
+            <a:r>
+              <a:rPr lang="pt-BR" sz="3200" dirty="0">
+                <a:solidFill>
+                  <a:schemeClr val="tx1"/>
+                </a:solidFill>
+                <a:latin typeface="Arial" panose="020B0604020202020204" pitchFamily="34" charset="0"/>
+                <a:cs typeface="Arial" panose="020B0604020202020204" pitchFamily="34" charset="0"/>
+              </a:rPr>
+              <a:t> + </a:t>
+            </a:r>
+            <a:r>
+              <a:rPr lang="pt-BR" sz="3200" dirty="0" err="1">
+                <a:solidFill>
+                  <a:schemeClr val="tx1"/>
+                </a:solidFill>
+                <a:latin typeface="Arial" panose="020B0604020202020204" pitchFamily="34" charset="0"/>
+                <a:cs typeface="Arial" panose="020B0604020202020204" pitchFamily="34" charset="0"/>
+              </a:rPr>
+              <a:t>evaluate_rules</a:t>
+            </a:r>
+            <a:r>
+              <a:rPr lang="pt-BR" sz="3200" dirty="0">
+                <a:solidFill>
+                  <a:schemeClr val="tx1"/>
+                </a:solidFill>
+                <a:latin typeface="Arial" panose="020B0604020202020204" pitchFamily="34" charset="0"/>
+                <a:cs typeface="Arial" panose="020B0604020202020204" pitchFamily="34" charset="0"/>
+              </a:rPr>
+              <a:t> para obter graus de ativação e logs.</a:t>
+            </a:r>
             <a:endParaRPr lang="pt-BR" sz="2800" dirty="0">
               <a:solidFill>
                 <a:schemeClr val="tx1"/>
               </a:solidFill>
+              <a:latin typeface="Arial" panose="020B0604020202020204" pitchFamily="34" charset="0"/>
+              <a:cs typeface="Arial" panose="020B0604020202020204" pitchFamily="34" charset="0"/>
             </a:endParaRPr>
           </a:p>
           <a:p>
@@ -1392,13 +1637,24 @@
                 <a:solidFill>
                   <a:schemeClr val="tx1"/>
                 </a:solidFill>
+                <a:latin typeface="Arial" panose="020B0604020202020204" pitchFamily="34" charset="0"/>
+                <a:cs typeface="Arial" panose="020B0604020202020204" pitchFamily="34" charset="0"/>
               </a:rPr>
               <a:t>RESULTADOS</a:t>
             </a:r>
-            <a:endParaRPr lang="pt-BR" sz="7500" b="1" dirty="0">
+          </a:p>
+          <a:p>
+            <a:pPr algn="just">
+              <a:spcBef>
+                <a:spcPts val="0"/>
+              </a:spcBef>
+            </a:pPr>
+            <a:endParaRPr lang="pt-BR" sz="2000" b="1" dirty="0">
               <a:solidFill>
                 <a:schemeClr val="tx1"/>
               </a:solidFill>
+              <a:latin typeface="Arial" panose="020B0604020202020204" pitchFamily="34" charset="0"/>
+              <a:cs typeface="Arial" panose="020B0604020202020204" pitchFamily="34" charset="0"/>
             </a:endParaRPr>
           </a:p>
           <a:p>
@@ -1412,8 +1668,110 @@
                 <a:solidFill>
                   <a:schemeClr val="tx1"/>
                 </a:solidFill>
-              </a:rPr>
-              <a:t>   O comportamento do semáforo é diretamente determinado pela pontuação contínua de prioridade_troca. Quando esta pontuação atinge ou ultrapassa o Limiar de troca de 5.0, o semáforo que estava verde inicia a transição para amarelo. Esta troca é retardada pelo YELLOW_TIME (configurável como 2 * FPS). Um exemplo prático ilustra a eficácia: se uma via acumula 6 carros enquanto o verde oposto está ativo por 12 segundos, as regras Fuzzy disparam, elevando a prioridade para ALTA, forçando a troca para a via de espera. A sensibilidade do sistema pode ser ajustada modificando-se os universos, as funções de pertinência, as regras ou o próprio limiar de 5.0, permitindo um comportamento mais conservador ou agressivo.</a:t>
+                <a:latin typeface="Arial" panose="020B0604020202020204" pitchFamily="34" charset="0"/>
+                <a:cs typeface="Arial" panose="020B0604020202020204" pitchFamily="34" charset="0"/>
+              </a:rPr>
+              <a:t>   Implementada </a:t>
+            </a:r>
+            <a:r>
+              <a:rPr lang="pt-BR" sz="3200" dirty="0" err="1">
+                <a:solidFill>
+                  <a:schemeClr val="tx1"/>
+                </a:solidFill>
+                <a:latin typeface="Arial" panose="020B0604020202020204" pitchFamily="34" charset="0"/>
+                <a:cs typeface="Arial" panose="020B0604020202020204" pitchFamily="34" charset="0"/>
+              </a:rPr>
+              <a:t>fuzzificação</a:t>
+            </a:r>
+            <a:r>
+              <a:rPr lang="pt-BR" sz="3200" dirty="0">
+                <a:solidFill>
+                  <a:schemeClr val="tx1"/>
+                </a:solidFill>
+                <a:latin typeface="Arial" panose="020B0604020202020204" pitchFamily="34" charset="0"/>
+                <a:cs typeface="Arial" panose="020B0604020202020204" pitchFamily="34" charset="0"/>
+              </a:rPr>
+              <a:t> (</a:t>
+            </a:r>
+            <a:r>
+              <a:rPr lang="pt-BR" sz="3200" dirty="0" err="1">
+                <a:solidFill>
+                  <a:schemeClr val="tx1"/>
+                </a:solidFill>
+                <a:latin typeface="Arial" panose="020B0604020202020204" pitchFamily="34" charset="0"/>
+                <a:cs typeface="Arial" panose="020B0604020202020204" pitchFamily="34" charset="0"/>
+              </a:rPr>
+              <a:t>MFs</a:t>
+            </a:r>
+            <a:r>
+              <a:rPr lang="pt-BR" sz="3200" dirty="0">
+                <a:solidFill>
+                  <a:schemeClr val="tx1"/>
+                </a:solidFill>
+                <a:latin typeface="Arial" panose="020B0604020202020204" pitchFamily="34" charset="0"/>
+                <a:cs typeface="Arial" panose="020B0604020202020204" pitchFamily="34" charset="0"/>
+              </a:rPr>
+              <a:t> </a:t>
+            </a:r>
+            <a:r>
+              <a:rPr lang="pt-BR" sz="3200" dirty="0" err="1">
+                <a:solidFill>
+                  <a:schemeClr val="tx1"/>
+                </a:solidFill>
+                <a:latin typeface="Arial" panose="020B0604020202020204" pitchFamily="34" charset="0"/>
+                <a:cs typeface="Arial" panose="020B0604020202020204" pitchFamily="34" charset="0"/>
+              </a:rPr>
+              <a:t>trimf</a:t>
+            </a:r>
+            <a:r>
+              <a:rPr lang="pt-BR" sz="3200" dirty="0">
+                <a:solidFill>
+                  <a:schemeClr val="tx1"/>
+                </a:solidFill>
+                <a:latin typeface="Arial" panose="020B0604020202020204" pitchFamily="34" charset="0"/>
+                <a:cs typeface="Arial" panose="020B0604020202020204" pitchFamily="34" charset="0"/>
+              </a:rPr>
+              <a:t>), base de regras (9 regras conforme especificado) e </a:t>
+            </a:r>
+            <a:r>
+              <a:rPr lang="pt-BR" sz="3200" dirty="0" err="1">
+                <a:solidFill>
+                  <a:schemeClr val="tx1"/>
+                </a:solidFill>
+                <a:latin typeface="Arial" panose="020B0604020202020204" pitchFamily="34" charset="0"/>
+                <a:cs typeface="Arial" panose="020B0604020202020204" pitchFamily="34" charset="0"/>
+              </a:rPr>
+              <a:t>defuzzificação</a:t>
+            </a:r>
+            <a:r>
+              <a:rPr lang="pt-BR" sz="3200" dirty="0">
+                <a:solidFill>
+                  <a:schemeClr val="tx1"/>
+                </a:solidFill>
+                <a:latin typeface="Arial" panose="020B0604020202020204" pitchFamily="34" charset="0"/>
+                <a:cs typeface="Arial" panose="020B0604020202020204" pitchFamily="34" charset="0"/>
+              </a:rPr>
+              <a:t> por </a:t>
+            </a:r>
+            <a:r>
+              <a:rPr lang="pt-BR" sz="3200" dirty="0" err="1">
+                <a:solidFill>
+                  <a:schemeClr val="tx1"/>
+                </a:solidFill>
+                <a:latin typeface="Arial" panose="020B0604020202020204" pitchFamily="34" charset="0"/>
+                <a:cs typeface="Arial" panose="020B0604020202020204" pitchFamily="34" charset="0"/>
+              </a:rPr>
+              <a:t>centróide</a:t>
+            </a:r>
+            <a:r>
+              <a:rPr lang="pt-BR" sz="3200" dirty="0">
+                <a:solidFill>
+                  <a:schemeClr val="tx1"/>
+                </a:solidFill>
+                <a:latin typeface="Arial" panose="020B0604020202020204" pitchFamily="34" charset="0"/>
+                <a:cs typeface="Arial" panose="020B0604020202020204" pitchFamily="34" charset="0"/>
+              </a:rPr>
+              <a:t>. O sistema ajusta tempo do verde em tempo real, imprime regras ativadas com graus, reseta cenário ao alterar ambiente e exibe tempo recomendado na HUD. Observou-se comportamento mais adaptativo a picos e chuva, com trocas mais coerentes que a heurística pura.</a:t>
             </a:r>
           </a:p>
         </p:txBody>
@@ -1428,7 +1786,7 @@
         </p:nvSpPr>
         <p:spPr>
           <a:xfrm>
-            <a:off x="16035133" y="12176232"/>
+            <a:off x="16212075" y="11970852"/>
             <a:ext cx="15576604" cy="24332124"/>
           </a:xfrm>
           <a:prstGeom prst="rect">
@@ -1451,7 +1809,10 @@
               </a:spcBef>
             </a:pPr>
             <a:r>
-              <a:rPr lang="pt-BR" sz="6600" b="1" dirty="0"/>
+              <a:rPr lang="pt-BR" sz="6600" b="1" dirty="0">
+                <a:latin typeface="Arial" panose="020B0604020202020204" pitchFamily="34" charset="0"/>
+                <a:cs typeface="Arial" panose="020B0604020202020204" pitchFamily="34" charset="0"/>
+              </a:rPr>
               <a:t>REGRAS FUZZY (RESUMIDAS)</a:t>
             </a:r>
           </a:p>
@@ -1461,87 +1822,160 @@
                 <a:spcPts val="0"/>
               </a:spcBef>
             </a:pPr>
-            <a:endParaRPr lang="pt-BR" sz="3200" b="1" dirty="0"/>
-          </a:p>
-          <a:p>
-            <a:pPr algn="just">
-              <a:spcBef>
-                <a:spcPts val="0"/>
-              </a:spcBef>
-            </a:pPr>
-            <a:r>
-              <a:rPr lang="pt-BR" sz="3200" b="1" dirty="0"/>
-              <a:t>- Se há muitos carros na via vermelha E o tempo de verde atual é longo → prioridade ALTA.</a:t>
-            </a:r>
-          </a:p>
-          <a:p>
-            <a:pPr algn="just">
-              <a:spcBef>
-                <a:spcPts val="0"/>
-              </a:spcBef>
-            </a:pPr>
-            <a:r>
-              <a:rPr lang="pt-BR" sz="3200" b="1" dirty="0"/>
-              <a:t>- Se há muitos carros na via vermelha E o tempo de verde atual é médio → prioridade ALTA.</a:t>
-            </a:r>
-          </a:p>
-          <a:p>
-            <a:pPr algn="just">
-              <a:spcBef>
-                <a:spcPts val="0"/>
-              </a:spcBef>
-            </a:pPr>
-            <a:r>
-              <a:rPr lang="pt-BR" sz="3200" b="1" dirty="0"/>
-              <a:t>- Se há número médio de carros na via vermelha → prioridade MÉDIA.</a:t>
-            </a:r>
-          </a:p>
-          <a:p>
-            <a:pPr algn="just">
-              <a:spcBef>
-                <a:spcPts val="0"/>
-              </a:spcBef>
-            </a:pPr>
-            <a:r>
-              <a:rPr lang="pt-BR" sz="3200" b="1" dirty="0"/>
-              <a:t>- Se há poucos carros na via vermelha → prioridade BAIXA.</a:t>
-            </a:r>
-          </a:p>
-          <a:p>
-            <a:pPr algn="just">
-              <a:spcBef>
-                <a:spcPts val="0"/>
-              </a:spcBef>
-            </a:pPr>
-            <a:r>
-              <a:rPr lang="pt-BR" sz="3200" b="1" dirty="0"/>
-              <a:t>- Se o tempo de verde atual é curto → prioridade BAIXA.</a:t>
-            </a:r>
-          </a:p>
-          <a:p>
-            <a:pPr algn="just">
-              <a:spcBef>
-                <a:spcPts val="0"/>
-              </a:spcBef>
-            </a:pPr>
-            <a:endParaRPr lang="pt-BR" sz="3200" b="1" dirty="0"/>
-          </a:p>
-          <a:p>
-            <a:pPr algn="just">
-              <a:spcBef>
-                <a:spcPts val="0"/>
-              </a:spcBef>
-            </a:pPr>
-            <a:endParaRPr lang="pt-BR" sz="9600" b="1" dirty="0"/>
-          </a:p>
-          <a:p>
-            <a:r>
-              <a:rPr lang="pt-BR" sz="4400" b="1" dirty="0"/>
+            <a:endParaRPr lang="pt-BR" sz="3200" b="1" dirty="0">
+              <a:latin typeface="Arial" panose="020B0604020202020204" pitchFamily="34" charset="0"/>
+              <a:cs typeface="Arial" panose="020B0604020202020204" pitchFamily="34" charset="0"/>
+            </a:endParaRPr>
+          </a:p>
+          <a:p>
+            <a:pPr algn="just">
+              <a:spcBef>
+                <a:spcPts val="0"/>
+              </a:spcBef>
+            </a:pPr>
+            <a:r>
+              <a:rPr lang="pt-BR" sz="3200" dirty="0">
+                <a:latin typeface="Arial" panose="020B0604020202020204" pitchFamily="34" charset="0"/>
+                <a:cs typeface="Arial" panose="020B0604020202020204" pitchFamily="34" charset="0"/>
+              </a:rPr>
+              <a:t>1) SE (Fluxo de Carros é Alto) E (Horário é de Pico) ENTÃO (Tempo é Alto).</a:t>
+            </a:r>
+          </a:p>
+          <a:p>
+            <a:pPr algn="just">
+              <a:spcBef>
+                <a:spcPts val="0"/>
+              </a:spcBef>
+            </a:pPr>
+            <a:r>
+              <a:rPr lang="pt-BR" sz="3200" dirty="0">
+                <a:latin typeface="Arial" panose="020B0604020202020204" pitchFamily="34" charset="0"/>
+                <a:cs typeface="Arial" panose="020B0604020202020204" pitchFamily="34" charset="0"/>
+              </a:rPr>
+              <a:t>2) SE (Fluxo de Carros é Médio) E (Fluxo de Pedestres é Médio) E (Horário é Normal) ENTÃO (Tempo é Médio).</a:t>
+            </a:r>
+          </a:p>
+          <a:p>
+            <a:pPr algn="just">
+              <a:spcBef>
+                <a:spcPts val="0"/>
+              </a:spcBef>
+            </a:pPr>
+            <a:r>
+              <a:rPr lang="pt-BR" sz="3200" dirty="0">
+                <a:latin typeface="Arial" panose="020B0604020202020204" pitchFamily="34" charset="0"/>
+                <a:cs typeface="Arial" panose="020B0604020202020204" pitchFamily="34" charset="0"/>
+              </a:rPr>
+              <a:t>3) SE (Fluxo de Carros é Baixo) OU (Fluxo de Pedestres é Baixo) ENTÃO (Tempo é Baixo).</a:t>
+            </a:r>
+          </a:p>
+          <a:p>
+            <a:pPr algn="just">
+              <a:spcBef>
+                <a:spcPts val="0"/>
+              </a:spcBef>
+            </a:pPr>
+            <a:r>
+              <a:rPr lang="pt-BR" sz="3200" dirty="0">
+                <a:latin typeface="Arial" panose="020B0604020202020204" pitchFamily="34" charset="0"/>
+                <a:cs typeface="Arial" panose="020B0604020202020204" pitchFamily="34" charset="0"/>
+              </a:rPr>
+              <a:t>4) SE (Fluxo de Carros é Alto) E (Fluxo de Pedestres é Alto) E (Horário é Normal) ENTÃO (Tempo é Médio).</a:t>
+            </a:r>
+          </a:p>
+          <a:p>
+            <a:pPr algn="just">
+              <a:spcBef>
+                <a:spcPts val="0"/>
+              </a:spcBef>
+            </a:pPr>
+            <a:r>
+              <a:rPr lang="pt-BR" sz="3200" dirty="0">
+                <a:latin typeface="Arial" panose="020B0604020202020204" pitchFamily="34" charset="0"/>
+                <a:cs typeface="Arial" panose="020B0604020202020204" pitchFamily="34" charset="0"/>
+              </a:rPr>
+              <a:t>5) SE (Fluxo de Carros é Alto) E (Fluxo de Pedestres é Alto) E (Horário é de Pico) ENTÃO (Tempo é Alto).</a:t>
+            </a:r>
+          </a:p>
+          <a:p>
+            <a:pPr algn="just">
+              <a:spcBef>
+                <a:spcPts val="0"/>
+              </a:spcBef>
+            </a:pPr>
+            <a:r>
+              <a:rPr lang="pt-BR" sz="3200" dirty="0">
+                <a:latin typeface="Arial" panose="020B0604020202020204" pitchFamily="34" charset="0"/>
+                <a:cs typeface="Arial" panose="020B0604020202020204" pitchFamily="34" charset="0"/>
+              </a:rPr>
+              <a:t>6) SE (Fluxo de Carros é Alto) E (Clima é Chuvoso) ENTÃO (Tempo é Alto).</a:t>
+            </a:r>
+          </a:p>
+          <a:p>
+            <a:pPr algn="just">
+              <a:spcBef>
+                <a:spcPts val="0"/>
+              </a:spcBef>
+            </a:pPr>
+            <a:r>
+              <a:rPr lang="pt-BR" sz="3200" dirty="0">
+                <a:latin typeface="Arial" panose="020B0604020202020204" pitchFamily="34" charset="0"/>
+                <a:cs typeface="Arial" panose="020B0604020202020204" pitchFamily="34" charset="0"/>
+              </a:rPr>
+              <a:t>7) SE Fluxo de Carros é Baixo E Fluxo de Pedestres é Baixo E Horário Outro ENTÃO Tempo Baixo.</a:t>
+            </a:r>
+          </a:p>
+          <a:p>
+            <a:pPr algn="just">
+              <a:spcBef>
+                <a:spcPts val="0"/>
+              </a:spcBef>
+            </a:pPr>
+            <a:r>
+              <a:rPr lang="pt-BR" sz="3200" dirty="0">
+                <a:latin typeface="Arial" panose="020B0604020202020204" pitchFamily="34" charset="0"/>
+                <a:cs typeface="Arial" panose="020B0604020202020204" pitchFamily="34" charset="0"/>
+              </a:rPr>
+              <a:t>8) SE Fluxo de Carros é Baixo E Fluxo de Pedestres é Alto ENTÃO Tempo Médio.</a:t>
+            </a:r>
+          </a:p>
+          <a:p>
+            <a:pPr algn="just">
+              <a:spcBef>
+                <a:spcPts val="0"/>
+              </a:spcBef>
+            </a:pPr>
+            <a:r>
+              <a:rPr lang="pt-BR" sz="3200" dirty="0">
+                <a:latin typeface="Arial" panose="020B0604020202020204" pitchFamily="34" charset="0"/>
+                <a:cs typeface="Arial" panose="020B0604020202020204" pitchFamily="34" charset="0"/>
+              </a:rPr>
+              <a:t>9) SE Fluxo de Carros é Médio E Horário é Outro ENTÃO Tempo Médio.</a:t>
+            </a:r>
+          </a:p>
+          <a:p>
+            <a:pPr algn="just">
+              <a:spcBef>
+                <a:spcPts val="0"/>
+              </a:spcBef>
+            </a:pPr>
+            <a:endParaRPr lang="pt-BR" sz="3600" b="1" dirty="0">
+              <a:latin typeface="Arial" panose="020B0604020202020204" pitchFamily="34" charset="0"/>
+              <a:cs typeface="Arial" panose="020B0604020202020204" pitchFamily="34" charset="0"/>
+            </a:endParaRPr>
+          </a:p>
+          <a:p>
+            <a:r>
+              <a:rPr lang="pt-BR" sz="4400" b="1" dirty="0">
+                <a:latin typeface="Arial" panose="020B0604020202020204" pitchFamily="34" charset="0"/>
+                <a:cs typeface="Arial" panose="020B0604020202020204" pitchFamily="34" charset="0"/>
+              </a:rPr>
               <a:t>Figura 1 – Exemplo figura</a:t>
             </a:r>
             <a:endParaRPr lang="pt-BR" sz="4400" b="1" dirty="0">
+              <a:latin typeface="Arial" panose="020B0604020202020204" pitchFamily="34" charset="0"/>
               <a:ea typeface="Calibri"/>
-              <a:cs typeface="Calibri"/>
+              <a:cs typeface="Arial" panose="020B0604020202020204" pitchFamily="34" charset="0"/>
             </a:endParaRPr>
           </a:p>
           <a:p>
@@ -1550,64 +1984,136 @@
                 <a:spcPts val="0"/>
               </a:spcBef>
             </a:pPr>
-            <a:endParaRPr lang="pt-BR" sz="9600" b="1" dirty="0"/>
-          </a:p>
-          <a:p>
-            <a:pPr algn="just">
-              <a:spcBef>
-                <a:spcPts val="0"/>
-              </a:spcBef>
-            </a:pPr>
-            <a:endParaRPr lang="pt-BR" sz="9600" b="1" dirty="0"/>
-          </a:p>
-          <a:p>
-            <a:pPr algn="just">
-              <a:spcBef>
-                <a:spcPts val="0"/>
-              </a:spcBef>
-            </a:pPr>
-            <a:endParaRPr lang="pt-BR" sz="9600" b="1" dirty="0"/>
-          </a:p>
-          <a:p>
-            <a:pPr algn="just">
-              <a:spcBef>
-                <a:spcPts val="0"/>
-              </a:spcBef>
-            </a:pPr>
-            <a:endParaRPr lang="pt-BR" sz="9600" b="1" dirty="0"/>
-          </a:p>
-          <a:p>
-            <a:pPr algn="just">
-              <a:spcBef>
-                <a:spcPts val="0"/>
-              </a:spcBef>
-            </a:pPr>
-            <a:endParaRPr lang="pt-BR" sz="9600" b="1" dirty="0"/>
+            <a:endParaRPr lang="pt-BR" sz="9600" b="1" dirty="0">
+              <a:latin typeface="Arial" panose="020B0604020202020204" pitchFamily="34" charset="0"/>
+              <a:cs typeface="Arial" panose="020B0604020202020204" pitchFamily="34" charset="0"/>
+            </a:endParaRPr>
+          </a:p>
+          <a:p>
+            <a:pPr algn="just">
+              <a:spcBef>
+                <a:spcPts val="0"/>
+              </a:spcBef>
+            </a:pPr>
+            <a:endParaRPr lang="pt-BR" sz="9600" b="1" dirty="0">
+              <a:latin typeface="Arial" panose="020B0604020202020204" pitchFamily="34" charset="0"/>
+              <a:cs typeface="Arial" panose="020B0604020202020204" pitchFamily="34" charset="0"/>
+            </a:endParaRPr>
+          </a:p>
+          <a:p>
+            <a:pPr algn="just">
+              <a:spcBef>
+                <a:spcPts val="0"/>
+              </a:spcBef>
+            </a:pPr>
+            <a:endParaRPr lang="pt-BR" sz="9600" b="1" dirty="0">
+              <a:latin typeface="Arial" panose="020B0604020202020204" pitchFamily="34" charset="0"/>
+              <a:cs typeface="Arial" panose="020B0604020202020204" pitchFamily="34" charset="0"/>
+            </a:endParaRPr>
+          </a:p>
+          <a:p>
+            <a:pPr algn="just">
+              <a:spcBef>
+                <a:spcPts val="0"/>
+              </a:spcBef>
+            </a:pPr>
+            <a:endParaRPr lang="pt-BR" sz="9600" b="1" dirty="0">
+              <a:latin typeface="Arial" panose="020B0604020202020204" pitchFamily="34" charset="0"/>
+              <a:cs typeface="Arial" panose="020B0604020202020204" pitchFamily="34" charset="0"/>
+            </a:endParaRPr>
+          </a:p>
+          <a:p>
+            <a:pPr algn="just">
+              <a:spcBef>
+                <a:spcPts val="0"/>
+              </a:spcBef>
+            </a:pPr>
+            <a:endParaRPr lang="pt-BR" sz="9600" b="1" dirty="0">
+              <a:latin typeface="Arial" panose="020B0604020202020204" pitchFamily="34" charset="0"/>
+              <a:cs typeface="Arial" panose="020B0604020202020204" pitchFamily="34" charset="0"/>
+            </a:endParaRPr>
           </a:p>
           <a:p>
             <a:pPr algn="just"/>
-            <a:endParaRPr lang="pt-BR" sz="9600" b="1" dirty="0"/>
+            <a:endParaRPr lang="pt-BR" sz="9600" b="1" dirty="0">
+              <a:latin typeface="Arial" panose="020B0604020202020204" pitchFamily="34" charset="0"/>
+              <a:cs typeface="Arial" panose="020B0604020202020204" pitchFamily="34" charset="0"/>
+            </a:endParaRPr>
           </a:p>
           <a:p>
             <a:pPr algn="just"/>
-            <a:endParaRPr lang="pt-BR" sz="9600" b="1" dirty="0"/>
-          </a:p>
-          <a:p>
-            <a:pPr algn="just">
-              <a:spcBef>
-                <a:spcPts val="0"/>
-              </a:spcBef>
-            </a:pPr>
-            <a:r>
-              <a:rPr lang="pt-BR" sz="6600" b="1" dirty="0"/>
-              <a:t>CONCLUSÃO</a:t>
-            </a:r>
-            <a:endParaRPr lang="pt-BR" sz="9600" b="1" dirty="0"/>
-          </a:p>
-          <a:p>
-            <a:r>
-              <a:rPr lang="pt-BR" sz="3200" dirty="0"/>
-              <a:t>   O simulador demonstra uma solução robusta e dinâmica para o controle de tráfego, utilizando a lógica Fuzzy para tomar decisões inteligentes baseadas em condições de fila e tempo de serviço. A arquitetura permite que o TrafficLightController consulte o FuzzyController em tempo real para iniciar a sequência de troca. A flexibilidade do modelo é alta, pois os parâmetros cruciais como STOP_*, QUEUE_LENGTH, FPS, e o PRIORITY_THRESHOLD (5.0) são ajustáveis, permitindo experimentação e otimização do comportamento observado.</a:t>
+            <a:endParaRPr lang="pt-BR" sz="9600" b="1" dirty="0">
+              <a:latin typeface="Arial" panose="020B0604020202020204" pitchFamily="34" charset="0"/>
+              <a:cs typeface="Arial" panose="020B0604020202020204" pitchFamily="34" charset="0"/>
+            </a:endParaRPr>
+          </a:p>
+          <a:p>
+            <a:pPr algn="just"/>
+            <a:endParaRPr lang="pt-BR" sz="3200" b="1" dirty="0">
+              <a:latin typeface="Arial" panose="020B0604020202020204" pitchFamily="34" charset="0"/>
+              <a:cs typeface="Arial" panose="020B0604020202020204" pitchFamily="34" charset="0"/>
+            </a:endParaRPr>
+          </a:p>
+          <a:p>
+            <a:pPr algn="just">
+              <a:spcBef>
+                <a:spcPts val="0"/>
+              </a:spcBef>
+            </a:pPr>
+            <a:r>
+              <a:rPr lang="pt-BR" sz="6600" b="1" dirty="0">
+                <a:latin typeface="Arial" panose="020B0604020202020204" pitchFamily="34" charset="0"/>
+                <a:cs typeface="Arial" panose="020B0604020202020204" pitchFamily="34" charset="0"/>
+              </a:rPr>
+              <a:t> CONCLUSÃO</a:t>
+            </a:r>
+          </a:p>
+          <a:p>
+            <a:pPr algn="just">
+              <a:spcBef>
+                <a:spcPts val="0"/>
+              </a:spcBef>
+            </a:pPr>
+            <a:endParaRPr lang="pt-BR" sz="2000" b="1" dirty="0">
+              <a:latin typeface="Arial" panose="020B0604020202020204" pitchFamily="34" charset="0"/>
+              <a:cs typeface="Arial" panose="020B0604020202020204" pitchFamily="34" charset="0"/>
+            </a:endParaRPr>
+          </a:p>
+          <a:p>
+            <a:r>
+              <a:rPr lang="pt-BR" sz="3200" dirty="0">
+                <a:latin typeface="Arial" panose="020B0604020202020204" pitchFamily="34" charset="0"/>
+                <a:cs typeface="Arial" panose="020B0604020202020204" pitchFamily="34" charset="0"/>
+              </a:rPr>
+              <a:t>    A aplicação mostrou que o controlador </a:t>
+            </a:r>
+            <a:r>
+              <a:rPr lang="pt-BR" sz="3200" dirty="0" err="1">
+                <a:latin typeface="Arial" panose="020B0604020202020204" pitchFamily="34" charset="0"/>
+                <a:cs typeface="Arial" panose="020B0604020202020204" pitchFamily="34" charset="0"/>
+              </a:rPr>
+              <a:t>fuzzy</a:t>
+            </a:r>
+            <a:r>
+              <a:rPr lang="pt-BR" sz="3200" dirty="0">
+                <a:latin typeface="Arial" panose="020B0604020202020204" pitchFamily="34" charset="0"/>
+                <a:cs typeface="Arial" panose="020B0604020202020204" pitchFamily="34" charset="0"/>
+              </a:rPr>
+              <a:t> adapta o tempo verde às        condições ambientais: tempos maiores em horários de pico e chuva, menores com fluxo/pedestres baixos. As impressões das regras e seus graus confirmam decisões graduais e interpretáveis. Nos testes, a lógica </a:t>
+            </a:r>
+            <a:r>
+              <a:rPr lang="pt-BR" sz="3200" dirty="0" err="1">
+                <a:latin typeface="Arial" panose="020B0604020202020204" pitchFamily="34" charset="0"/>
+                <a:cs typeface="Arial" panose="020B0604020202020204" pitchFamily="34" charset="0"/>
+              </a:rPr>
+              <a:t>fuzzy</a:t>
+            </a:r>
+            <a:r>
+              <a:rPr lang="pt-BR" sz="3200" dirty="0">
+                <a:latin typeface="Arial" panose="020B0604020202020204" pitchFamily="34" charset="0"/>
+                <a:cs typeface="Arial" panose="020B0604020202020204" pitchFamily="34" charset="0"/>
+              </a:rPr>
+              <a:t> comportou-se de forma consistente e eficaz para ajustar dinamicamente o semáforo.</a:t>
             </a:r>
           </a:p>
         </p:txBody>
@@ -1748,7 +2254,7 @@
         </p:nvSpPr>
         <p:spPr>
           <a:xfrm>
-            <a:off x="861805" y="36508356"/>
+            <a:off x="696254" y="36499706"/>
             <a:ext cx="30749932" cy="5903380"/>
           </a:xfrm>
           <a:prstGeom prst="rect">
@@ -2129,10 +2635,10 @@
       </p:pic>
       <p:pic>
         <p:nvPicPr>
-          <p:cNvPr id="10" name="Imagem 9">
+          <p:cNvPr id="8" name="Imagem 7">
             <a:extLst>
               <a:ext uri="{FF2B5EF4-FFF2-40B4-BE49-F238E27FC236}">
-                <a16:creationId xmlns:a16="http://schemas.microsoft.com/office/drawing/2014/main" id="{0965D759-C48D-4FB7-95A4-FA144F2E93F1}"/>
+                <a16:creationId xmlns:a16="http://schemas.microsoft.com/office/drawing/2014/main" id="{47EA2AF3-87B7-48A8-9F41-A772F18C6AD4}"/>
               </a:ext>
             </a:extLst>
           </p:cNvPr>
@@ -2149,8 +2655,8 @@
         </p:blipFill>
         <p:spPr>
           <a:xfrm>
-            <a:off x="18530847" y="20086619"/>
-            <a:ext cx="10585176" cy="9405410"/>
+            <a:off x="18434273" y="22375172"/>
+            <a:ext cx="9721080" cy="10161280"/>
           </a:xfrm>
           <a:prstGeom prst="rect">
             <a:avLst/>

</xml_diff>